<commit_message>
Updated multinomial fit 501Y.V1 & 501Y.V2 with estimated growth rate advantage for Belgium
</commit_message>
<xml_diff>
--- a/plots/2021_02_09/baseline_sequencing_501YV1 501YV2.pptx
+++ b/plots/2021_02_09/baseline_sequencing_501YV1 501YV2.pptx
@@ -3613,7 +3613,7 @@
               </a:pathLst>
             </a:custGeom>
             <a:solidFill>
-              <a:srgbClr val="F08080">
+              <a:srgbClr val="0000FF">
                 <a:alpha val="100000"/>
               </a:srgbClr>
             </a:solidFill>
@@ -4843,7 +4843,7 @@
               <a:avLst/>
             </a:prstGeom>
             <a:solidFill>
-              <a:srgbClr val="F08080">
+              <a:srgbClr val="0000FF">
                 <a:alpha val="100000"/>
               </a:srgbClr>
             </a:solidFill>

</xml_diff>